<commit_message>
additional change to ppt
</commit_message>
<xml_diff>
--- a/Anagram Presentation_ag.pptx
+++ b/Anagram Presentation_ag.pptx
@@ -4327,13 +4327,26 @@
           <a:p>
             <a:r>
               <a:rPr lang="en-US" dirty="0" smtClean="0"/>
-              <a:t>A starting point for future enhancements such as multi-player versions, user accounts, rankings, avatars, and .</a:t>
-            </a:r>
-          </a:p>
-          <a:p>
+              <a:t>A starting point for future enhancements such as multi-player versions, user accounts, rankings, avatars, and </a:t>
+            </a:r>
             <a:r>
               <a:rPr lang="en-US" dirty="0" smtClean="0"/>
-              <a:t>Potential education use.  Anagrams have been used in teaching reading.</a:t>
+              <a:t>visual progress animations.</a:t>
+            </a:r>
+            <a:endParaRPr lang="en-US" dirty="0" smtClean="0"/>
+          </a:p>
+          <a:p>
+            <a:r>
+              <a:rPr lang="en-US" smtClean="0"/>
+              <a:t>Potential </a:t>
+            </a:r>
+            <a:r>
+              <a:rPr lang="en-US" smtClean="0"/>
+              <a:t>educational </a:t>
+            </a:r>
+            <a:r>
+              <a:rPr lang="en-US" dirty="0" smtClean="0"/>
+              <a:t>use.  Anagrams have been used in teaching reading.</a:t>
             </a:r>
           </a:p>
           <a:p>
@@ -5701,130 +5714,12 @@
 </file>
 
 <file path=customXml/item1.xml><?xml version="1.0" encoding="utf-8"?>
-<p:properties xmlns:p="http://schemas.microsoft.com/office/2006/metadata/properties" xmlns:xsi="http://www.w3.org/2001/XMLSchema-instance" xmlns:pc="http://schemas.microsoft.com/office/infopath/2007/PartnerControls">
-  <documentManagement>
-    <DirectSourceMarket xmlns="4873beb7-5857-4685-be1f-d57550cc96cc" xsi:nil="true"/>
-    <ApprovalStatus xmlns="4873beb7-5857-4685-be1f-d57550cc96cc">InProgress</ApprovalStatus>
-    <MarketSpecific xmlns="4873beb7-5857-4685-be1f-d57550cc96cc">false</MarketSpecific>
-    <LocComments xmlns="4873beb7-5857-4685-be1f-d57550cc96cc" xsi:nil="true"/>
-    <ThumbnailAssetId xmlns="4873beb7-5857-4685-be1f-d57550cc96cc" xsi:nil="true"/>
-    <PrimaryImageGen xmlns="4873beb7-5857-4685-be1f-d57550cc96cc">true</PrimaryImageGen>
-    <LegacyData xmlns="4873beb7-5857-4685-be1f-d57550cc96cc" xsi:nil="true"/>
-    <LocRecommendedHandoff xmlns="4873beb7-5857-4685-be1f-d57550cc96cc" xsi:nil="true"/>
-    <BusinessGroup xmlns="4873beb7-5857-4685-be1f-d57550cc96cc" xsi:nil="true"/>
-    <BlockPublish xmlns="4873beb7-5857-4685-be1f-d57550cc96cc">false</BlockPublish>
-    <TPFriendlyName xmlns="4873beb7-5857-4685-be1f-d57550cc96cc" xsi:nil="true"/>
-    <NumericId xmlns="4873beb7-5857-4685-be1f-d57550cc96cc" xsi:nil="true"/>
-    <APEditor xmlns="4873beb7-5857-4685-be1f-d57550cc96cc">
-      <UserInfo>
-        <DisplayName/>
-        <AccountId xsi:nil="true"/>
-        <AccountType/>
-      </UserInfo>
-    </APEditor>
-    <SourceTitle xmlns="4873beb7-5857-4685-be1f-d57550cc96cc" xsi:nil="true"/>
-    <OpenTemplate xmlns="4873beb7-5857-4685-be1f-d57550cc96cc">true</OpenTemplate>
-    <UALocComments xmlns="4873beb7-5857-4685-be1f-d57550cc96cc" xsi:nil="true"/>
-    <ParentAssetId xmlns="4873beb7-5857-4685-be1f-d57550cc96cc" xsi:nil="true"/>
-    <IntlLangReviewDate xmlns="4873beb7-5857-4685-be1f-d57550cc96cc" xsi:nil="true"/>
-    <FeatureTagsTaxHTField0 xmlns="4873beb7-5857-4685-be1f-d57550cc96cc">
-      <Terms xmlns="http://schemas.microsoft.com/office/infopath/2007/PartnerControls"/>
-    </FeatureTagsTaxHTField0>
-    <PublishStatusLookup xmlns="4873beb7-5857-4685-be1f-d57550cc96cc">
-      <Value>1564227</Value>
-    </PublishStatusLookup>
-    <Providers xmlns="4873beb7-5857-4685-be1f-d57550cc96cc" xsi:nil="true"/>
-    <MachineTranslated xmlns="4873beb7-5857-4685-be1f-d57550cc96cc">false</MachineTranslated>
-    <OriginalSourceMarket xmlns="4873beb7-5857-4685-be1f-d57550cc96cc" xsi:nil="true"/>
-    <APDescription xmlns="4873beb7-5857-4685-be1f-d57550cc96cc">Take your audience through a digital tunnel where they'll  burst through to the other side and see the information you want to present. Show them lists, charts, tables, SmartArt,  and pictures using a variety of layouts in widescreen (16X9) format. This design works well for subjects on science and technology, computers, communication, and more.   
-</APDescription>
-    <ClipArtFilename xmlns="4873beb7-5857-4685-be1f-d57550cc96cc" xsi:nil="true"/>
-    <ContentItem xmlns="4873beb7-5857-4685-be1f-d57550cc96cc" xsi:nil="true"/>
-    <TPInstallLocation xmlns="4873beb7-5857-4685-be1f-d57550cc96cc" xsi:nil="true"/>
-    <PublishTargets xmlns="4873beb7-5857-4685-be1f-d57550cc96cc">OfficeOnlineVNext</PublishTargets>
-    <TimesCloned xmlns="4873beb7-5857-4685-be1f-d57550cc96cc" xsi:nil="true"/>
-    <AssetStart xmlns="4873beb7-5857-4685-be1f-d57550cc96cc">2012-05-11T02:04:00+00:00</AssetStart>
-    <Provider xmlns="4873beb7-5857-4685-be1f-d57550cc96cc" xsi:nil="true"/>
-    <AcquiredFrom xmlns="4873beb7-5857-4685-be1f-d57550cc96cc">Internal MS</AcquiredFrom>
-    <FriendlyTitle xmlns="4873beb7-5857-4685-be1f-d57550cc96cc" xsi:nil="true"/>
-    <LastHandOff xmlns="4873beb7-5857-4685-be1f-d57550cc96cc" xsi:nil="true"/>
-    <TPClientViewer xmlns="4873beb7-5857-4685-be1f-d57550cc96cc" xsi:nil="true"/>
-    <UACurrentWords xmlns="4873beb7-5857-4685-be1f-d57550cc96cc" xsi:nil="true"/>
-    <ArtSampleDocs xmlns="4873beb7-5857-4685-be1f-d57550cc96cc" xsi:nil="true"/>
-    <UALocRecommendation xmlns="4873beb7-5857-4685-be1f-d57550cc96cc">Localize</UALocRecommendation>
-    <Manager xmlns="4873beb7-5857-4685-be1f-d57550cc96cc" xsi:nil="true"/>
-    <ShowIn xmlns="4873beb7-5857-4685-be1f-d57550cc96cc">Show everywhere</ShowIn>
-    <UANotes xmlns="4873beb7-5857-4685-be1f-d57550cc96cc" xsi:nil="true"/>
-    <TemplateStatus xmlns="4873beb7-5857-4685-be1f-d57550cc96cc">Complete</TemplateStatus>
-    <InternalTagsTaxHTField0 xmlns="4873beb7-5857-4685-be1f-d57550cc96cc">
-      <Terms xmlns="http://schemas.microsoft.com/office/infopath/2007/PartnerControls"/>
-    </InternalTagsTaxHTField0>
-    <CSXHash xmlns="4873beb7-5857-4685-be1f-d57550cc96cc" xsi:nil="true"/>
-    <Downloads xmlns="4873beb7-5857-4685-be1f-d57550cc96cc">0</Downloads>
-    <VoteCount xmlns="4873beb7-5857-4685-be1f-d57550cc96cc" xsi:nil="true"/>
-    <OOCacheId xmlns="4873beb7-5857-4685-be1f-d57550cc96cc" xsi:nil="true"/>
-    <IsDeleted xmlns="4873beb7-5857-4685-be1f-d57550cc96cc">false</IsDeleted>
-    <AssetExpire xmlns="4873beb7-5857-4685-be1f-d57550cc96cc">2029-01-01T08:00:00+00:00</AssetExpire>
-    <DSATActionTaken xmlns="4873beb7-5857-4685-be1f-d57550cc96cc" xsi:nil="true"/>
-    <CSXSubmissionMarket xmlns="4873beb7-5857-4685-be1f-d57550cc96cc" xsi:nil="true"/>
-    <TPExecutable xmlns="4873beb7-5857-4685-be1f-d57550cc96cc" xsi:nil="true"/>
-    <SubmitterId xmlns="4873beb7-5857-4685-be1f-d57550cc96cc" xsi:nil="true"/>
-    <EditorialTags xmlns="4873beb7-5857-4685-be1f-d57550cc96cc" xsi:nil="true"/>
-    <ApprovalLog xmlns="4873beb7-5857-4685-be1f-d57550cc96cc" xsi:nil="true"/>
-    <AssetType xmlns="4873beb7-5857-4685-be1f-d57550cc96cc">TP</AssetType>
-    <BugNumber xmlns="4873beb7-5857-4685-be1f-d57550cc96cc" xsi:nil="true"/>
-    <CSXSubmissionDate xmlns="4873beb7-5857-4685-be1f-d57550cc96cc" xsi:nil="true"/>
-    <CSXUpdate xmlns="4873beb7-5857-4685-be1f-d57550cc96cc">false</CSXUpdate>
-    <Milestone xmlns="4873beb7-5857-4685-be1f-d57550cc96cc" xsi:nil="true"/>
-    <RecommendationsModifier xmlns="4873beb7-5857-4685-be1f-d57550cc96cc" xsi:nil="true"/>
-    <OriginAsset xmlns="4873beb7-5857-4685-be1f-d57550cc96cc" xsi:nil="true"/>
-    <TPComponent xmlns="4873beb7-5857-4685-be1f-d57550cc96cc" xsi:nil="true"/>
-    <AssetId xmlns="4873beb7-5857-4685-be1f-d57550cc96cc">TP102895246</AssetId>
-    <IntlLocPriority xmlns="4873beb7-5857-4685-be1f-d57550cc96cc" xsi:nil="true"/>
-    <PolicheckWords xmlns="4873beb7-5857-4685-be1f-d57550cc96cc" xsi:nil="true"/>
-    <TPLaunchHelpLink xmlns="4873beb7-5857-4685-be1f-d57550cc96cc" xsi:nil="true"/>
-    <TPApplication xmlns="4873beb7-5857-4685-be1f-d57550cc96cc" xsi:nil="true"/>
-    <CrawlForDependencies xmlns="4873beb7-5857-4685-be1f-d57550cc96cc">false</CrawlForDependencies>
-    <HandoffToMSDN xmlns="4873beb7-5857-4685-be1f-d57550cc96cc" xsi:nil="true"/>
-    <PlannedPubDate xmlns="4873beb7-5857-4685-be1f-d57550cc96cc" xsi:nil="true"/>
-    <IntlLangReviewer xmlns="4873beb7-5857-4685-be1f-d57550cc96cc" xsi:nil="true"/>
-    <TrustLevel xmlns="4873beb7-5857-4685-be1f-d57550cc96cc">1 Microsoft Managed Content</TrustLevel>
-    <LocLastLocAttemptVersionLookup xmlns="4873beb7-5857-4685-be1f-d57550cc96cc">835483</LocLastLocAttemptVersionLookup>
-    <IsSearchable xmlns="4873beb7-5857-4685-be1f-d57550cc96cc">true</IsSearchable>
-    <TemplateTemplateType xmlns="4873beb7-5857-4685-be1f-d57550cc96cc">PowerPoint Presentation Template</TemplateTemplateType>
-    <CampaignTagsTaxHTField0 xmlns="4873beb7-5857-4685-be1f-d57550cc96cc">
-      <Terms xmlns="http://schemas.microsoft.com/office/infopath/2007/PartnerControls"/>
-    </CampaignTagsTaxHTField0>
-    <TPNamespace xmlns="4873beb7-5857-4685-be1f-d57550cc96cc" xsi:nil="true"/>
-    <TaxCatchAll xmlns="4873beb7-5857-4685-be1f-d57550cc96cc"/>
-    <Markets xmlns="4873beb7-5857-4685-be1f-d57550cc96cc"/>
-    <UAProjectedTotalWords xmlns="4873beb7-5857-4685-be1f-d57550cc96cc" xsi:nil="true"/>
-    <IntlLangReview xmlns="4873beb7-5857-4685-be1f-d57550cc96cc">false</IntlLangReview>
-    <OutputCachingOn xmlns="4873beb7-5857-4685-be1f-d57550cc96cc">false</OutputCachingOn>
-    <AverageRating xmlns="4873beb7-5857-4685-be1f-d57550cc96cc" xsi:nil="true"/>
-    <APAuthor xmlns="4873beb7-5857-4685-be1f-d57550cc96cc">
-      <UserInfo>
-        <DisplayName>REDMOND\v-vaddu</DisplayName>
-        <AccountId>2567</AccountId>
-        <AccountType/>
-      </UserInfo>
-    </APAuthor>
-    <LocManualTestRequired xmlns="4873beb7-5857-4685-be1f-d57550cc96cc">false</LocManualTestRequired>
-    <TPCommandLine xmlns="4873beb7-5857-4685-be1f-d57550cc96cc" xsi:nil="true"/>
-    <TPAppVersion xmlns="4873beb7-5857-4685-be1f-d57550cc96cc" xsi:nil="true"/>
-    <EditorialStatus xmlns="4873beb7-5857-4685-be1f-d57550cc96cc">Complete</EditorialStatus>
-    <LastModifiedDateTime xmlns="4873beb7-5857-4685-be1f-d57550cc96cc" xsi:nil="true"/>
-    <ScenarioTagsTaxHTField0 xmlns="4873beb7-5857-4685-be1f-d57550cc96cc">
-      <Terms xmlns="http://schemas.microsoft.com/office/infopath/2007/PartnerControls"/>
-    </ScenarioTagsTaxHTField0>
-    <OriginalRelease xmlns="4873beb7-5857-4685-be1f-d57550cc96cc">15</OriginalRelease>
-    <TPLaunchHelpLinkType xmlns="4873beb7-5857-4685-be1f-d57550cc96cc">Template</TPLaunchHelpLinkType>
-    <LocalizationTagsTaxHTField0 xmlns="4873beb7-5857-4685-be1f-d57550cc96cc">
-      <Terms xmlns="http://schemas.microsoft.com/office/infopath/2007/PartnerControls"/>
-    </LocalizationTagsTaxHTField0>
-    <LocMarketGroupTiers2 xmlns="4873beb7-5857-4685-be1f-d57550cc96cc" xsi:nil="true"/>
-  </documentManagement>
-</p:properties>
+<?mso-contentType ?>
+<FormTemplates xmlns="http://schemas.microsoft.com/sharepoint/v3/contenttype/forms">
+  <Display>DocumentLibraryForm</Display>
+  <Edit>AssetEditForm</Edit>
+  <New>DocumentLibraryForm</New>
+</FormTemplates>
 </file>
 
 <file path=customXml/item2.xml><?xml version="1.0" encoding="utf-8"?>
@@ -6868,26 +6763,136 @@
 </file>
 
 <file path=customXml/item3.xml><?xml version="1.0" encoding="utf-8"?>
-<?mso-contentType ?>
-<FormTemplates xmlns="http://schemas.microsoft.com/sharepoint/v3/contenttype/forms">
-  <Display>DocumentLibraryForm</Display>
-  <Edit>AssetEditForm</Edit>
-  <New>DocumentLibraryForm</New>
-</FormTemplates>
+<p:properties xmlns:p="http://schemas.microsoft.com/office/2006/metadata/properties" xmlns:xsi="http://www.w3.org/2001/XMLSchema-instance" xmlns:pc="http://schemas.microsoft.com/office/infopath/2007/PartnerControls">
+  <documentManagement>
+    <DirectSourceMarket xmlns="4873beb7-5857-4685-be1f-d57550cc96cc" xsi:nil="true"/>
+    <ApprovalStatus xmlns="4873beb7-5857-4685-be1f-d57550cc96cc">InProgress</ApprovalStatus>
+    <MarketSpecific xmlns="4873beb7-5857-4685-be1f-d57550cc96cc">false</MarketSpecific>
+    <LocComments xmlns="4873beb7-5857-4685-be1f-d57550cc96cc" xsi:nil="true"/>
+    <ThumbnailAssetId xmlns="4873beb7-5857-4685-be1f-d57550cc96cc" xsi:nil="true"/>
+    <PrimaryImageGen xmlns="4873beb7-5857-4685-be1f-d57550cc96cc">true</PrimaryImageGen>
+    <LegacyData xmlns="4873beb7-5857-4685-be1f-d57550cc96cc" xsi:nil="true"/>
+    <LocRecommendedHandoff xmlns="4873beb7-5857-4685-be1f-d57550cc96cc" xsi:nil="true"/>
+    <BusinessGroup xmlns="4873beb7-5857-4685-be1f-d57550cc96cc" xsi:nil="true"/>
+    <BlockPublish xmlns="4873beb7-5857-4685-be1f-d57550cc96cc">false</BlockPublish>
+    <TPFriendlyName xmlns="4873beb7-5857-4685-be1f-d57550cc96cc" xsi:nil="true"/>
+    <NumericId xmlns="4873beb7-5857-4685-be1f-d57550cc96cc" xsi:nil="true"/>
+    <APEditor xmlns="4873beb7-5857-4685-be1f-d57550cc96cc">
+      <UserInfo>
+        <DisplayName/>
+        <AccountId xsi:nil="true"/>
+        <AccountType/>
+      </UserInfo>
+    </APEditor>
+    <SourceTitle xmlns="4873beb7-5857-4685-be1f-d57550cc96cc" xsi:nil="true"/>
+    <OpenTemplate xmlns="4873beb7-5857-4685-be1f-d57550cc96cc">true</OpenTemplate>
+    <UALocComments xmlns="4873beb7-5857-4685-be1f-d57550cc96cc" xsi:nil="true"/>
+    <ParentAssetId xmlns="4873beb7-5857-4685-be1f-d57550cc96cc" xsi:nil="true"/>
+    <IntlLangReviewDate xmlns="4873beb7-5857-4685-be1f-d57550cc96cc" xsi:nil="true"/>
+    <FeatureTagsTaxHTField0 xmlns="4873beb7-5857-4685-be1f-d57550cc96cc">
+      <Terms xmlns="http://schemas.microsoft.com/office/infopath/2007/PartnerControls"/>
+    </FeatureTagsTaxHTField0>
+    <PublishStatusLookup xmlns="4873beb7-5857-4685-be1f-d57550cc96cc">
+      <Value>1564227</Value>
+    </PublishStatusLookup>
+    <Providers xmlns="4873beb7-5857-4685-be1f-d57550cc96cc" xsi:nil="true"/>
+    <MachineTranslated xmlns="4873beb7-5857-4685-be1f-d57550cc96cc">false</MachineTranslated>
+    <OriginalSourceMarket xmlns="4873beb7-5857-4685-be1f-d57550cc96cc" xsi:nil="true"/>
+    <APDescription xmlns="4873beb7-5857-4685-be1f-d57550cc96cc">Take your audience through a digital tunnel where they'll  burst through to the other side and see the information you want to present. Show them lists, charts, tables, SmartArt,  and pictures using a variety of layouts in widescreen (16X9) format. This design works well for subjects on science and technology, computers, communication, and more.   
+</APDescription>
+    <ClipArtFilename xmlns="4873beb7-5857-4685-be1f-d57550cc96cc" xsi:nil="true"/>
+    <ContentItem xmlns="4873beb7-5857-4685-be1f-d57550cc96cc" xsi:nil="true"/>
+    <TPInstallLocation xmlns="4873beb7-5857-4685-be1f-d57550cc96cc" xsi:nil="true"/>
+    <PublishTargets xmlns="4873beb7-5857-4685-be1f-d57550cc96cc">OfficeOnlineVNext</PublishTargets>
+    <TimesCloned xmlns="4873beb7-5857-4685-be1f-d57550cc96cc" xsi:nil="true"/>
+    <AssetStart xmlns="4873beb7-5857-4685-be1f-d57550cc96cc">2012-05-11T02:04:00+00:00</AssetStart>
+    <Provider xmlns="4873beb7-5857-4685-be1f-d57550cc96cc" xsi:nil="true"/>
+    <AcquiredFrom xmlns="4873beb7-5857-4685-be1f-d57550cc96cc">Internal MS</AcquiredFrom>
+    <FriendlyTitle xmlns="4873beb7-5857-4685-be1f-d57550cc96cc" xsi:nil="true"/>
+    <LastHandOff xmlns="4873beb7-5857-4685-be1f-d57550cc96cc" xsi:nil="true"/>
+    <TPClientViewer xmlns="4873beb7-5857-4685-be1f-d57550cc96cc" xsi:nil="true"/>
+    <UACurrentWords xmlns="4873beb7-5857-4685-be1f-d57550cc96cc" xsi:nil="true"/>
+    <ArtSampleDocs xmlns="4873beb7-5857-4685-be1f-d57550cc96cc" xsi:nil="true"/>
+    <UALocRecommendation xmlns="4873beb7-5857-4685-be1f-d57550cc96cc">Localize</UALocRecommendation>
+    <Manager xmlns="4873beb7-5857-4685-be1f-d57550cc96cc" xsi:nil="true"/>
+    <ShowIn xmlns="4873beb7-5857-4685-be1f-d57550cc96cc">Show everywhere</ShowIn>
+    <UANotes xmlns="4873beb7-5857-4685-be1f-d57550cc96cc" xsi:nil="true"/>
+    <TemplateStatus xmlns="4873beb7-5857-4685-be1f-d57550cc96cc">Complete</TemplateStatus>
+    <InternalTagsTaxHTField0 xmlns="4873beb7-5857-4685-be1f-d57550cc96cc">
+      <Terms xmlns="http://schemas.microsoft.com/office/infopath/2007/PartnerControls"/>
+    </InternalTagsTaxHTField0>
+    <CSXHash xmlns="4873beb7-5857-4685-be1f-d57550cc96cc" xsi:nil="true"/>
+    <Downloads xmlns="4873beb7-5857-4685-be1f-d57550cc96cc">0</Downloads>
+    <VoteCount xmlns="4873beb7-5857-4685-be1f-d57550cc96cc" xsi:nil="true"/>
+    <OOCacheId xmlns="4873beb7-5857-4685-be1f-d57550cc96cc" xsi:nil="true"/>
+    <IsDeleted xmlns="4873beb7-5857-4685-be1f-d57550cc96cc">false</IsDeleted>
+    <AssetExpire xmlns="4873beb7-5857-4685-be1f-d57550cc96cc">2029-01-01T08:00:00+00:00</AssetExpire>
+    <DSATActionTaken xmlns="4873beb7-5857-4685-be1f-d57550cc96cc" xsi:nil="true"/>
+    <CSXSubmissionMarket xmlns="4873beb7-5857-4685-be1f-d57550cc96cc" xsi:nil="true"/>
+    <TPExecutable xmlns="4873beb7-5857-4685-be1f-d57550cc96cc" xsi:nil="true"/>
+    <SubmitterId xmlns="4873beb7-5857-4685-be1f-d57550cc96cc" xsi:nil="true"/>
+    <EditorialTags xmlns="4873beb7-5857-4685-be1f-d57550cc96cc" xsi:nil="true"/>
+    <ApprovalLog xmlns="4873beb7-5857-4685-be1f-d57550cc96cc" xsi:nil="true"/>
+    <AssetType xmlns="4873beb7-5857-4685-be1f-d57550cc96cc">TP</AssetType>
+    <BugNumber xmlns="4873beb7-5857-4685-be1f-d57550cc96cc" xsi:nil="true"/>
+    <CSXSubmissionDate xmlns="4873beb7-5857-4685-be1f-d57550cc96cc" xsi:nil="true"/>
+    <CSXUpdate xmlns="4873beb7-5857-4685-be1f-d57550cc96cc">false</CSXUpdate>
+    <Milestone xmlns="4873beb7-5857-4685-be1f-d57550cc96cc" xsi:nil="true"/>
+    <RecommendationsModifier xmlns="4873beb7-5857-4685-be1f-d57550cc96cc" xsi:nil="true"/>
+    <OriginAsset xmlns="4873beb7-5857-4685-be1f-d57550cc96cc" xsi:nil="true"/>
+    <TPComponent xmlns="4873beb7-5857-4685-be1f-d57550cc96cc" xsi:nil="true"/>
+    <AssetId xmlns="4873beb7-5857-4685-be1f-d57550cc96cc">TP102895246</AssetId>
+    <IntlLocPriority xmlns="4873beb7-5857-4685-be1f-d57550cc96cc" xsi:nil="true"/>
+    <PolicheckWords xmlns="4873beb7-5857-4685-be1f-d57550cc96cc" xsi:nil="true"/>
+    <TPLaunchHelpLink xmlns="4873beb7-5857-4685-be1f-d57550cc96cc" xsi:nil="true"/>
+    <TPApplication xmlns="4873beb7-5857-4685-be1f-d57550cc96cc" xsi:nil="true"/>
+    <CrawlForDependencies xmlns="4873beb7-5857-4685-be1f-d57550cc96cc">false</CrawlForDependencies>
+    <HandoffToMSDN xmlns="4873beb7-5857-4685-be1f-d57550cc96cc" xsi:nil="true"/>
+    <PlannedPubDate xmlns="4873beb7-5857-4685-be1f-d57550cc96cc" xsi:nil="true"/>
+    <IntlLangReviewer xmlns="4873beb7-5857-4685-be1f-d57550cc96cc" xsi:nil="true"/>
+    <TrustLevel xmlns="4873beb7-5857-4685-be1f-d57550cc96cc">1 Microsoft Managed Content</TrustLevel>
+    <LocLastLocAttemptVersionLookup xmlns="4873beb7-5857-4685-be1f-d57550cc96cc">835483</LocLastLocAttemptVersionLookup>
+    <IsSearchable xmlns="4873beb7-5857-4685-be1f-d57550cc96cc">true</IsSearchable>
+    <TemplateTemplateType xmlns="4873beb7-5857-4685-be1f-d57550cc96cc">PowerPoint Presentation Template</TemplateTemplateType>
+    <CampaignTagsTaxHTField0 xmlns="4873beb7-5857-4685-be1f-d57550cc96cc">
+      <Terms xmlns="http://schemas.microsoft.com/office/infopath/2007/PartnerControls"/>
+    </CampaignTagsTaxHTField0>
+    <TPNamespace xmlns="4873beb7-5857-4685-be1f-d57550cc96cc" xsi:nil="true"/>
+    <TaxCatchAll xmlns="4873beb7-5857-4685-be1f-d57550cc96cc"/>
+    <Markets xmlns="4873beb7-5857-4685-be1f-d57550cc96cc"/>
+    <UAProjectedTotalWords xmlns="4873beb7-5857-4685-be1f-d57550cc96cc" xsi:nil="true"/>
+    <IntlLangReview xmlns="4873beb7-5857-4685-be1f-d57550cc96cc">false</IntlLangReview>
+    <OutputCachingOn xmlns="4873beb7-5857-4685-be1f-d57550cc96cc">false</OutputCachingOn>
+    <AverageRating xmlns="4873beb7-5857-4685-be1f-d57550cc96cc" xsi:nil="true"/>
+    <APAuthor xmlns="4873beb7-5857-4685-be1f-d57550cc96cc">
+      <UserInfo>
+        <DisplayName>REDMOND\v-vaddu</DisplayName>
+        <AccountId>2567</AccountId>
+        <AccountType/>
+      </UserInfo>
+    </APAuthor>
+    <LocManualTestRequired xmlns="4873beb7-5857-4685-be1f-d57550cc96cc">false</LocManualTestRequired>
+    <TPCommandLine xmlns="4873beb7-5857-4685-be1f-d57550cc96cc" xsi:nil="true"/>
+    <TPAppVersion xmlns="4873beb7-5857-4685-be1f-d57550cc96cc" xsi:nil="true"/>
+    <EditorialStatus xmlns="4873beb7-5857-4685-be1f-d57550cc96cc">Complete</EditorialStatus>
+    <LastModifiedDateTime xmlns="4873beb7-5857-4685-be1f-d57550cc96cc" xsi:nil="true"/>
+    <ScenarioTagsTaxHTField0 xmlns="4873beb7-5857-4685-be1f-d57550cc96cc">
+      <Terms xmlns="http://schemas.microsoft.com/office/infopath/2007/PartnerControls"/>
+    </ScenarioTagsTaxHTField0>
+    <OriginalRelease xmlns="4873beb7-5857-4685-be1f-d57550cc96cc">15</OriginalRelease>
+    <TPLaunchHelpLinkType xmlns="4873beb7-5857-4685-be1f-d57550cc96cc">Template</TPLaunchHelpLinkType>
+    <LocalizationTagsTaxHTField0 xmlns="4873beb7-5857-4685-be1f-d57550cc96cc">
+      <Terms xmlns="http://schemas.microsoft.com/office/infopath/2007/PartnerControls"/>
+    </LocalizationTagsTaxHTField0>
+    <LocMarketGroupTiers2 xmlns="4873beb7-5857-4685-be1f-d57550cc96cc" xsi:nil="true"/>
+  </documentManagement>
+</p:properties>
 </file>
 
 <file path=customXml/itemProps1.xml><?xml version="1.0" encoding="utf-8"?>
-<ds:datastoreItem xmlns:ds="http://schemas.openxmlformats.org/officeDocument/2006/customXml" ds:itemID="{00E41224-0370-4595-877C-23316CD80004}">
+<ds:datastoreItem xmlns:ds="http://schemas.openxmlformats.org/officeDocument/2006/customXml" ds:itemID="{74228E6B-D70C-44BB-A81F-A245495F612B}">
   <ds:schemaRefs>
-    <ds:schemaRef ds:uri="http://schemas.openxmlformats.org/package/2006/metadata/core-properties"/>
-    <ds:schemaRef ds:uri="http://schemas.microsoft.com/office/infopath/2007/PartnerControls"/>
-    <ds:schemaRef ds:uri="http://purl.org/dc/terms/"/>
-    <ds:schemaRef ds:uri="http://purl.org/dc/dcmitype/"/>
-    <ds:schemaRef ds:uri="http://purl.org/dc/elements/1.1/"/>
-    <ds:schemaRef ds:uri="http://schemas.microsoft.com/office/2006/documentManagement/types"/>
-    <ds:schemaRef ds:uri="4873beb7-5857-4685-be1f-d57550cc96cc"/>
-    <ds:schemaRef ds:uri="http://schemas.microsoft.com/office/2006/metadata/properties"/>
-    <ds:schemaRef ds:uri="http://www.w3.org/XML/1998/namespace"/>
+    <ds:schemaRef ds:uri="http://schemas.microsoft.com/sharepoint/v3/contenttype/forms"/>
   </ds:schemaRefs>
 </ds:datastoreItem>
 </file>
@@ -6911,9 +6916,17 @@
 </file>
 
 <file path=customXml/itemProps3.xml><?xml version="1.0" encoding="utf-8"?>
-<ds:datastoreItem xmlns:ds="http://schemas.openxmlformats.org/officeDocument/2006/customXml" ds:itemID="{74228E6B-D70C-44BB-A81F-A245495F612B}">
+<ds:datastoreItem xmlns:ds="http://schemas.openxmlformats.org/officeDocument/2006/customXml" ds:itemID="{00E41224-0370-4595-877C-23316CD80004}">
   <ds:schemaRefs>
-    <ds:schemaRef ds:uri="http://schemas.microsoft.com/sharepoint/v3/contenttype/forms"/>
+    <ds:schemaRef ds:uri="http://schemas.openxmlformats.org/package/2006/metadata/core-properties"/>
+    <ds:schemaRef ds:uri="http://schemas.microsoft.com/office/infopath/2007/PartnerControls"/>
+    <ds:schemaRef ds:uri="http://purl.org/dc/terms/"/>
+    <ds:schemaRef ds:uri="http://purl.org/dc/dcmitype/"/>
+    <ds:schemaRef ds:uri="http://purl.org/dc/elements/1.1/"/>
+    <ds:schemaRef ds:uri="http://schemas.microsoft.com/office/2006/documentManagement/types"/>
+    <ds:schemaRef ds:uri="4873beb7-5857-4685-be1f-d57550cc96cc"/>
+    <ds:schemaRef ds:uri="http://schemas.microsoft.com/office/2006/metadata/properties"/>
+    <ds:schemaRef ds:uri="http://www.w3.org/XML/1998/namespace"/>
   </ds:schemaRefs>
 </ds:datastoreItem>
 </file>
</xml_diff>